<commit_message>
zeus fields and tables revised
</commit_message>
<xml_diff>
--- a/Proyecto Zeus - Rails.pptx
+++ b/Proyecto Zeus - Rails.pptx
@@ -344,7 +344,7 @@
             <a:fld id="{555B466B-AD3F-45F3-90D4-2662B9CB2B5C}" type="datetimeFigureOut">
               <a:rPr lang="es-AR" smtClean="0"/>
               <a:pPr/>
-              <a:t>25/5/2018</a:t>
+              <a:t>27/9/2019</a:t>
             </a:fld>
             <a:endParaRPr lang="es-AR"/>
           </a:p>
@@ -409,7 +409,7 @@
             <a:fld id="{685FA452-4338-48FE-B3D4-91F5EB6D3E85}" type="slidenum">
               <a:rPr lang="es-AR" smtClean="0"/>
               <a:pPr/>
-              <a:t>‹#›</a:t>
+              <a:t>‹Nº›</a:t>
             </a:fld>
             <a:endParaRPr lang="es-AR"/>
           </a:p>
@@ -533,7 +533,7 @@
             <a:fld id="{555B466B-AD3F-45F3-90D4-2662B9CB2B5C}" type="datetimeFigureOut">
               <a:rPr lang="es-AR" smtClean="0"/>
               <a:pPr/>
-              <a:t>25/5/2018</a:t>
+              <a:t>27/9/2019</a:t>
             </a:fld>
             <a:endParaRPr lang="es-AR"/>
           </a:p>
@@ -576,7 +576,7 @@
             <a:fld id="{685FA452-4338-48FE-B3D4-91F5EB6D3E85}" type="slidenum">
               <a:rPr lang="es-AR" smtClean="0"/>
               <a:pPr/>
-              <a:t>‹#›</a:t>
+              <a:t>‹Nº›</a:t>
             </a:fld>
             <a:endParaRPr lang="es-AR"/>
           </a:p>
@@ -710,7 +710,7 @@
             <a:fld id="{555B466B-AD3F-45F3-90D4-2662B9CB2B5C}" type="datetimeFigureOut">
               <a:rPr lang="es-AR" smtClean="0"/>
               <a:pPr/>
-              <a:t>25/5/2018</a:t>
+              <a:t>27/9/2019</a:t>
             </a:fld>
             <a:endParaRPr lang="es-AR"/>
           </a:p>
@@ -753,7 +753,7 @@
             <a:fld id="{685FA452-4338-48FE-B3D4-91F5EB6D3E85}" type="slidenum">
               <a:rPr lang="es-AR" smtClean="0"/>
               <a:pPr/>
-              <a:t>‹#›</a:t>
+              <a:t>‹Nº›</a:t>
             </a:fld>
             <a:endParaRPr lang="es-AR"/>
           </a:p>
@@ -892,7 +892,7 @@
             <a:fld id="{555B466B-AD3F-45F3-90D4-2662B9CB2B5C}" type="datetimeFigureOut">
               <a:rPr lang="es-AR" smtClean="0"/>
               <a:pPr/>
-              <a:t>25/5/2018</a:t>
+              <a:t>27/9/2019</a:t>
             </a:fld>
             <a:endParaRPr lang="es-AR"/>
           </a:p>
@@ -940,7 +940,7 @@
             <a:fld id="{685FA452-4338-48FE-B3D4-91F5EB6D3E85}" type="slidenum">
               <a:rPr lang="es-AR" smtClean="0"/>
               <a:pPr/>
-              <a:t>‹#›</a:t>
+              <a:t>‹Nº›</a:t>
             </a:fld>
             <a:endParaRPr lang="es-AR"/>
           </a:p>
@@ -1141,7 +1141,7 @@
             <a:fld id="{555B466B-AD3F-45F3-90D4-2662B9CB2B5C}" type="datetimeFigureOut">
               <a:rPr lang="es-AR" smtClean="0"/>
               <a:pPr/>
-              <a:t>25/5/2018</a:t>
+              <a:t>27/9/2019</a:t>
             </a:fld>
             <a:endParaRPr lang="es-AR"/>
           </a:p>
@@ -1194,7 +1194,7 @@
             <a:fld id="{685FA452-4338-48FE-B3D4-91F5EB6D3E85}" type="slidenum">
               <a:rPr lang="es-AR" smtClean="0"/>
               <a:pPr/>
-              <a:t>‹#›</a:t>
+              <a:t>‹Nº›</a:t>
             </a:fld>
             <a:endParaRPr lang="es-AR"/>
           </a:p>
@@ -1617,7 +1617,7 @@
             <a:fld id="{555B466B-AD3F-45F3-90D4-2662B9CB2B5C}" type="datetimeFigureOut">
               <a:rPr lang="es-AR" smtClean="0"/>
               <a:pPr/>
-              <a:t>25/5/2018</a:t>
+              <a:t>27/9/2019</a:t>
             </a:fld>
             <a:endParaRPr lang="es-AR"/>
           </a:p>
@@ -1670,7 +1670,7 @@
             <a:fld id="{685FA452-4338-48FE-B3D4-91F5EB6D3E85}" type="slidenum">
               <a:rPr lang="es-AR" smtClean="0"/>
               <a:pPr/>
-              <a:t>‹#›</a:t>
+              <a:t>‹Nº›</a:t>
             </a:fld>
             <a:endParaRPr lang="es-AR"/>
           </a:p>
@@ -2034,7 +2034,7 @@
             <a:fld id="{555B466B-AD3F-45F3-90D4-2662B9CB2B5C}" type="datetimeFigureOut">
               <a:rPr lang="es-AR" smtClean="0"/>
               <a:pPr/>
-              <a:t>25/5/2018</a:t>
+              <a:t>27/9/2019</a:t>
             </a:fld>
             <a:endParaRPr lang="es-AR"/>
           </a:p>
@@ -2091,7 +2091,7 @@
             <a:fld id="{685FA452-4338-48FE-B3D4-91F5EB6D3E85}" type="slidenum">
               <a:rPr lang="es-AR" smtClean="0"/>
               <a:pPr/>
-              <a:t>‹#›</a:t>
+              <a:t>‹Nº›</a:t>
             </a:fld>
             <a:endParaRPr lang="es-AR"/>
           </a:p>
@@ -2167,7 +2167,7 @@
             <a:fld id="{555B466B-AD3F-45F3-90D4-2662B9CB2B5C}" type="datetimeFigureOut">
               <a:rPr lang="es-AR" smtClean="0"/>
               <a:pPr/>
-              <a:t>25/5/2018</a:t>
+              <a:t>27/9/2019</a:t>
             </a:fld>
             <a:endParaRPr lang="es-AR"/>
           </a:p>
@@ -2210,7 +2210,7 @@
             <a:fld id="{685FA452-4338-48FE-B3D4-91F5EB6D3E85}" type="slidenum">
               <a:rPr lang="es-AR" smtClean="0"/>
               <a:pPr/>
-              <a:t>‹#›</a:t>
+              <a:t>‹Nº›</a:t>
             </a:fld>
             <a:endParaRPr lang="es-AR"/>
           </a:p>
@@ -2264,7 +2264,7 @@
             <a:fld id="{555B466B-AD3F-45F3-90D4-2662B9CB2B5C}" type="datetimeFigureOut">
               <a:rPr lang="es-AR" smtClean="0"/>
               <a:pPr/>
-              <a:t>25/5/2018</a:t>
+              <a:t>27/9/2019</a:t>
             </a:fld>
             <a:endParaRPr lang="es-AR"/>
           </a:p>
@@ -2317,7 +2317,7 @@
             <a:fld id="{685FA452-4338-48FE-B3D4-91F5EB6D3E85}" type="slidenum">
               <a:rPr lang="es-AR" smtClean="0"/>
               <a:pPr/>
-              <a:t>‹#›</a:t>
+              <a:t>‹Nº›</a:t>
             </a:fld>
             <a:endParaRPr lang="es-AR"/>
           </a:p>
@@ -2544,7 +2544,7 @@
             <a:fld id="{555B466B-AD3F-45F3-90D4-2662B9CB2B5C}" type="datetimeFigureOut">
               <a:rPr lang="es-AR" smtClean="0"/>
               <a:pPr/>
-              <a:t>25/5/2018</a:t>
+              <a:t>27/9/2019</a:t>
             </a:fld>
             <a:endParaRPr lang="es-AR"/>
           </a:p>
@@ -2605,7 +2605,7 @@
             <a:fld id="{685FA452-4338-48FE-B3D4-91F5EB6D3E85}" type="slidenum">
               <a:rPr lang="es-AR" smtClean="0"/>
               <a:pPr/>
-              <a:t>‹#›</a:t>
+              <a:t>‹Nº›</a:t>
             </a:fld>
             <a:endParaRPr lang="es-AR"/>
           </a:p>
@@ -2798,7 +2798,7 @@
             <a:fld id="{555B466B-AD3F-45F3-90D4-2662B9CB2B5C}" type="datetimeFigureOut">
               <a:rPr lang="es-AR" smtClean="0"/>
               <a:pPr/>
-              <a:t>25/5/2018</a:t>
+              <a:t>27/9/2019</a:t>
             </a:fld>
             <a:endParaRPr lang="es-AR"/>
           </a:p>
@@ -2859,7 +2859,7 @@
             <a:fld id="{685FA452-4338-48FE-B3D4-91F5EB6D3E85}" type="slidenum">
               <a:rPr lang="es-AR" smtClean="0"/>
               <a:pPr/>
-              <a:t>‹#›</a:t>
+              <a:t>‹Nº›</a:t>
             </a:fld>
             <a:endParaRPr lang="es-AR"/>
           </a:p>
@@ -3172,7 +3172,7 @@
             <a:fld id="{555B466B-AD3F-45F3-90D4-2662B9CB2B5C}" type="datetimeFigureOut">
               <a:rPr lang="es-AR" smtClean="0"/>
               <a:pPr/>
-              <a:t>25/5/2018</a:t>
+              <a:t>27/9/2019</a:t>
             </a:fld>
             <a:endParaRPr lang="es-AR"/>
           </a:p>
@@ -3247,7 +3247,7 @@
             <a:fld id="{685FA452-4338-48FE-B3D4-91F5EB6D3E85}" type="slidenum">
               <a:rPr lang="es-AR" smtClean="0"/>
               <a:pPr/>
-              <a:t>‹#›</a:t>
+              <a:t>‹Nº›</a:t>
             </a:fld>
             <a:endParaRPr lang="es-AR"/>
           </a:p>
@@ -3824,7 +3824,7 @@
             <a:pPr algn="ctr"/>
             <a:r>
               <a:rPr lang="es-AR" sz="1400" dirty="0"/>
-              <a:t>Edesal</a:t>
+              <a:t>Contrato Edesal</a:t>
             </a:r>
           </a:p>
         </p:txBody>
@@ -4244,13 +4244,13 @@
         </p:spPr>
         <p:style>
           <a:lnRef idx="1">
-            <a:schemeClr val="accent1"/>
+            <a:schemeClr val="accent3"/>
           </a:lnRef>
           <a:fillRef idx="0">
-            <a:schemeClr val="accent1"/>
+            <a:schemeClr val="accent3"/>
           </a:fillRef>
           <a:effectRef idx="0">
-            <a:schemeClr val="accent1"/>
+            <a:schemeClr val="accent3"/>
           </a:effectRef>
           <a:fontRef idx="minor">
             <a:schemeClr val="tx1"/>
@@ -4315,13 +4315,13 @@
         </p:spPr>
         <p:style>
           <a:lnRef idx="1">
-            <a:schemeClr val="accent1"/>
+            <a:schemeClr val="accent3"/>
           </a:lnRef>
           <a:fillRef idx="0">
-            <a:schemeClr val="accent1"/>
+            <a:schemeClr val="accent3"/>
           </a:fillRef>
           <a:effectRef idx="0">
-            <a:schemeClr val="accent1"/>
+            <a:schemeClr val="accent3"/>
           </a:effectRef>
           <a:fontRef idx="minor">
             <a:schemeClr val="tx1"/>
@@ -4350,13 +4350,13 @@
         </p:spPr>
         <p:style>
           <a:lnRef idx="1">
-            <a:schemeClr val="accent1"/>
+            <a:schemeClr val="accent3"/>
           </a:lnRef>
           <a:fillRef idx="0">
-            <a:schemeClr val="accent1"/>
+            <a:schemeClr val="accent3"/>
           </a:fillRef>
           <a:effectRef idx="0">
-            <a:schemeClr val="accent1"/>
+            <a:schemeClr val="accent3"/>
           </a:effectRef>
           <a:fontRef idx="minor">
             <a:schemeClr val="tx1"/>
@@ -4385,13 +4385,13 @@
         </p:spPr>
         <p:style>
           <a:lnRef idx="1">
-            <a:schemeClr val="accent1"/>
+            <a:schemeClr val="accent3"/>
           </a:lnRef>
           <a:fillRef idx="0">
-            <a:schemeClr val="accent1"/>
+            <a:schemeClr val="accent3"/>
           </a:fillRef>
           <a:effectRef idx="0">
-            <a:schemeClr val="accent1"/>
+            <a:schemeClr val="accent3"/>
           </a:effectRef>
           <a:fontRef idx="minor">
             <a:schemeClr val="tx1"/>
@@ -4418,13 +4418,13 @@
         </p:spPr>
         <p:style>
           <a:lnRef idx="1">
-            <a:schemeClr val="accent1"/>
+            <a:schemeClr val="accent3"/>
           </a:lnRef>
           <a:fillRef idx="0">
-            <a:schemeClr val="accent1"/>
+            <a:schemeClr val="accent3"/>
           </a:fillRef>
           <a:effectRef idx="0">
-            <a:schemeClr val="accent1"/>
+            <a:schemeClr val="accent3"/>
           </a:effectRef>
           <a:fontRef idx="minor">
             <a:schemeClr val="tx1"/>
@@ -4451,13 +4451,13 @@
         </p:spPr>
         <p:style>
           <a:lnRef idx="1">
-            <a:schemeClr val="accent1"/>
+            <a:schemeClr val="accent3"/>
           </a:lnRef>
           <a:fillRef idx="0">
-            <a:schemeClr val="accent1"/>
+            <a:schemeClr val="accent3"/>
           </a:fillRef>
           <a:effectRef idx="0">
-            <a:schemeClr val="accent1"/>
+            <a:schemeClr val="accent3"/>
           </a:effectRef>
           <a:fontRef idx="minor">
             <a:schemeClr val="tx1"/>
@@ -4574,13 +4574,13 @@
         </p:spPr>
         <p:style>
           <a:lnRef idx="1">
-            <a:schemeClr val="accent1"/>
+            <a:schemeClr val="accent3"/>
           </a:lnRef>
           <a:fillRef idx="0">
-            <a:schemeClr val="accent1"/>
+            <a:schemeClr val="accent3"/>
           </a:fillRef>
           <a:effectRef idx="0">
-            <a:schemeClr val="accent1"/>
+            <a:schemeClr val="accent3"/>
           </a:effectRef>
           <a:fontRef idx="minor">
             <a:schemeClr val="tx1"/>
@@ -4788,13 +4788,13 @@
         </p:spPr>
         <p:style>
           <a:lnRef idx="1">
-            <a:schemeClr val="accent1"/>
+            <a:schemeClr val="accent3"/>
           </a:lnRef>
           <a:fillRef idx="0">
-            <a:schemeClr val="accent1"/>
+            <a:schemeClr val="accent3"/>
           </a:fillRef>
           <a:effectRef idx="0">
-            <a:schemeClr val="accent1"/>
+            <a:schemeClr val="accent3"/>
           </a:effectRef>
           <a:fontRef idx="minor">
             <a:schemeClr val="tx1"/>
@@ -4829,13 +4829,13 @@
         </p:spPr>
         <p:style>
           <a:lnRef idx="1">
-            <a:schemeClr val="accent1"/>
+            <a:schemeClr val="accent3"/>
           </a:lnRef>
           <a:fillRef idx="0">
-            <a:schemeClr val="accent1"/>
+            <a:schemeClr val="accent3"/>
           </a:fillRef>
           <a:effectRef idx="0">
-            <a:schemeClr val="accent1"/>
+            <a:schemeClr val="accent3"/>
           </a:effectRef>
           <a:fontRef idx="minor">
             <a:schemeClr val="tx1"/>
@@ -4864,19 +4864,19 @@
           </a:xfrm>
           <a:prstGeom prst="bentConnector3">
             <a:avLst>
-              <a:gd name="adj1" fmla="val 12284"/>
+              <a:gd name="adj1" fmla="val 12050"/>
             </a:avLst>
           </a:prstGeom>
         </p:spPr>
         <p:style>
           <a:lnRef idx="1">
-            <a:schemeClr val="accent1"/>
+            <a:schemeClr val="accent3"/>
           </a:lnRef>
           <a:fillRef idx="0">
-            <a:schemeClr val="accent1"/>
+            <a:schemeClr val="accent3"/>
           </a:fillRef>
           <a:effectRef idx="0">
-            <a:schemeClr val="accent1"/>
+            <a:schemeClr val="accent3"/>
           </a:effectRef>
           <a:fontRef idx="minor">
             <a:schemeClr val="tx1"/>
@@ -4911,13 +4911,149 @@
         </p:spPr>
         <p:style>
           <a:lnRef idx="1">
-            <a:schemeClr val="accent1"/>
+            <a:schemeClr val="accent3"/>
           </a:lnRef>
           <a:fillRef idx="0">
-            <a:schemeClr val="accent1"/>
+            <a:schemeClr val="accent3"/>
           </a:fillRef>
           <a:effectRef idx="0">
-            <a:schemeClr val="accent1"/>
+            <a:schemeClr val="accent3"/>
+          </a:effectRef>
+          <a:fontRef idx="minor">
+            <a:schemeClr val="tx1"/>
+          </a:fontRef>
+        </p:style>
+      </p:cxnSp>
+      <p:sp>
+        <p:nvSpPr>
+          <p:cNvPr id="43" name="15 Rectángulo">
+            <a:extLst>
+              <a:ext uri="{FF2B5EF4-FFF2-40B4-BE49-F238E27FC236}">
+                <a16:creationId xmlns:a16="http://schemas.microsoft.com/office/drawing/2014/main" id="{144D3E10-EC53-4B83-8C78-AA4D765F4A3C}"/>
+              </a:ext>
+            </a:extLst>
+          </p:cNvPr>
+          <p:cNvSpPr/>
+          <p:nvPr/>
+        </p:nvSpPr>
+        <p:spPr>
+          <a:xfrm>
+            <a:off x="5652120" y="5805264"/>
+            <a:ext cx="1296144" cy="648072"/>
+          </a:xfrm>
+          <a:prstGeom prst="rect">
+            <a:avLst/>
+          </a:prstGeom>
+        </p:spPr>
+        <p:style>
+          <a:lnRef idx="2">
+            <a:schemeClr val="accent1">
+              <a:shade val="50000"/>
+            </a:schemeClr>
+          </a:lnRef>
+          <a:fillRef idx="1">
+            <a:schemeClr val="accent1"/>
+          </a:fillRef>
+          <a:effectRef idx="0">
+            <a:schemeClr val="accent1"/>
+          </a:effectRef>
+          <a:fontRef idx="minor">
+            <a:schemeClr val="lt1"/>
+          </a:fontRef>
+        </p:style>
+        <p:txBody>
+          <a:bodyPr rtlCol="0" anchor="ctr"/>
+          <a:lstStyle/>
+          <a:p>
+            <a:pPr algn="ctr"/>
+            <a:r>
+              <a:rPr lang="es-AR" sz="1400" dirty="0"/>
+              <a:t>Documentos</a:t>
+            </a:r>
+          </a:p>
+          <a:p>
+            <a:pPr algn="ctr"/>
+            <a:r>
+              <a:rPr lang="es-AR" sz="1400" dirty="0"/>
+              <a:t>PDF</a:t>
+            </a:r>
+          </a:p>
+        </p:txBody>
+      </p:sp>
+      <p:cxnSp>
+        <p:nvCxnSpPr>
+          <p:cNvPr id="46" name="42 Conector recto">
+            <a:extLst>
+              <a:ext uri="{FF2B5EF4-FFF2-40B4-BE49-F238E27FC236}">
+                <a16:creationId xmlns:a16="http://schemas.microsoft.com/office/drawing/2014/main" id="{5EB4C269-A83B-46BC-B9BB-728594A9A237}"/>
+              </a:ext>
+            </a:extLst>
+          </p:cNvPr>
+          <p:cNvCxnSpPr>
+            <a:cxnSpLocks/>
+          </p:cNvCxnSpPr>
+          <p:nvPr/>
+        </p:nvCxnSpPr>
+        <p:spPr>
+          <a:xfrm>
+            <a:off x="6948264" y="6117422"/>
+            <a:ext cx="288032" cy="0"/>
+          </a:xfrm>
+          <a:prstGeom prst="line">
+            <a:avLst/>
+          </a:prstGeom>
+        </p:spPr>
+        <p:style>
+          <a:lnRef idx="1">
+            <a:schemeClr val="accent1"/>
+          </a:lnRef>
+          <a:fillRef idx="0">
+            <a:schemeClr val="accent1"/>
+          </a:fillRef>
+          <a:effectRef idx="0">
+            <a:schemeClr val="accent1"/>
+          </a:effectRef>
+          <a:fontRef idx="minor">
+            <a:schemeClr val="tx1"/>
+          </a:fontRef>
+        </p:style>
+      </p:cxnSp>
+      <p:cxnSp>
+        <p:nvCxnSpPr>
+          <p:cNvPr id="48" name="26 Conector angular">
+            <a:extLst>
+              <a:ext uri="{FF2B5EF4-FFF2-40B4-BE49-F238E27FC236}">
+                <a16:creationId xmlns:a16="http://schemas.microsoft.com/office/drawing/2014/main" id="{4917666F-AF4F-4CF7-B0B6-1F29808CE20D}"/>
+              </a:ext>
+            </a:extLst>
+          </p:cNvPr>
+          <p:cNvCxnSpPr>
+            <a:cxnSpLocks/>
+            <a:stCxn id="6" idx="3"/>
+            <a:endCxn id="43" idx="1"/>
+          </p:cNvCxnSpPr>
+          <p:nvPr/>
+        </p:nvCxnSpPr>
+        <p:spPr>
+          <a:xfrm>
+            <a:off x="1619672" y="4257092"/>
+            <a:ext cx="4032448" cy="1872208"/>
+          </a:xfrm>
+          <a:prstGeom prst="bentConnector3">
+            <a:avLst>
+              <a:gd name="adj1" fmla="val 87871"/>
+            </a:avLst>
+          </a:prstGeom>
+        </p:spPr>
+        <p:style>
+          <a:lnRef idx="1">
+            <a:schemeClr val="accent3"/>
+          </a:lnRef>
+          <a:fillRef idx="0">
+            <a:schemeClr val="accent3"/>
+          </a:fillRef>
+          <a:effectRef idx="0">
+            <a:schemeClr val="accent3"/>
           </a:effectRef>
           <a:fontRef idx="minor">
             <a:schemeClr val="tx1"/>

</xml_diff>